<commit_message>
Cambios menores parte 2
</commit_message>
<xml_diff>
--- a/docs/Instalación.pptx
+++ b/docs/Instalación.pptx
@@ -3465,33 +3465,65 @@
           </a:p>
         </p:txBody>
       </p:sp>
+      <p:sp>
+        <p:nvSpPr>
+          <p:cNvPr id="4" name="Marcador de contenido 3">
+            <a:extLst>
+              <a:ext uri="{FF2B5EF4-FFF2-40B4-BE49-F238E27FC236}">
+                <a16:creationId xmlns:a16="http://schemas.microsoft.com/office/drawing/2014/main" id="{9145A328-A9C4-4C46-B44B-3FB16A8580C7}"/>
+              </a:ext>
+            </a:extLst>
+          </p:cNvPr>
+          <p:cNvSpPr>
+            <a:spLocks noGrp="1"/>
+          </p:cNvSpPr>
+          <p:nvPr>
+            <p:ph idx="1"/>
+          </p:nvPr>
+        </p:nvSpPr>
+        <p:spPr/>
+        <p:txBody>
+          <a:bodyPr/>
+          <a:lstStyle/>
+          <a:p>
+            <a:r>
+              <a:rPr lang="es-PE" dirty="0">
+                <a:hlinkClick r:id="rId2"/>
+              </a:rPr>
+              <a:t>https://github.com/Agc96/alertas-colegio</a:t>
+            </a:r>
+            <a:endParaRPr lang="es-PE" dirty="0"/>
+          </a:p>
+        </p:txBody>
+      </p:sp>
       <p:pic>
         <p:nvPicPr>
-          <p:cNvPr id="5" name="Marcador de contenido 4">
-            <a:extLst>
-              <a:ext uri="{FF2B5EF4-FFF2-40B4-BE49-F238E27FC236}">
-                <a16:creationId xmlns:a16="http://schemas.microsoft.com/office/drawing/2014/main" id="{B55C25B3-4662-447C-95EF-C5904193D6E1}"/>
+          <p:cNvPr id="6" name="Marcador de contenido 4">
+            <a:extLst>
+              <a:ext uri="{FF2B5EF4-FFF2-40B4-BE49-F238E27FC236}">
+                <a16:creationId xmlns:a16="http://schemas.microsoft.com/office/drawing/2014/main" id="{20535B15-818F-413A-AB0C-FF3B60968C11}"/>
               </a:ext>
             </a:extLst>
           </p:cNvPr>
           <p:cNvPicPr>
-            <a:picLocks noGrp="1" noChangeAspect="1"/>
+            <a:picLocks noChangeAspect="1"/>
           </p:cNvPicPr>
-          <p:nvPr>
-            <p:ph idx="1"/>
-          </p:nvPr>
+          <p:nvPr/>
         </p:nvPicPr>
         <p:blipFill>
-          <a:blip r:embed="rId2"/>
+          <a:blip r:embed="rId3"/>
           <a:stretch>
             <a:fillRect/>
           </a:stretch>
         </p:blipFill>
         <p:spPr>
           <a:xfrm>
-            <a:off x="1546014" y="1825625"/>
-            <a:ext cx="9099972" cy="4351338"/>
+            <a:off x="2267978" y="2516069"/>
+            <a:ext cx="7656043" cy="3660894"/>
           </a:xfrm>
+          <a:prstGeom prst="rect">
+            <a:avLst/>
+          </a:prstGeom>
         </p:spPr>
       </p:pic>
     </p:spTree>
@@ -3829,19 +3861,17 @@
       </p:sp>
       <p:pic>
         <p:nvPicPr>
-          <p:cNvPr id="5" name="Marcador de contenido 4">
-            <a:extLst>
-              <a:ext uri="{FF2B5EF4-FFF2-40B4-BE49-F238E27FC236}">
-                <a16:creationId xmlns:a16="http://schemas.microsoft.com/office/drawing/2014/main" id="{E2041CC0-CEC7-4169-8178-9F4D1CFFD87E}"/>
+          <p:cNvPr id="6" name="Marcador de contenido 6">
+            <a:extLst>
+              <a:ext uri="{FF2B5EF4-FFF2-40B4-BE49-F238E27FC236}">
+                <a16:creationId xmlns:a16="http://schemas.microsoft.com/office/drawing/2014/main" id="{3724DE91-0E94-4E3B-BEC8-160957424C7A}"/>
               </a:ext>
             </a:extLst>
           </p:cNvPr>
           <p:cNvPicPr>
-            <a:picLocks noGrp="1" noChangeAspect="1"/>
+            <a:picLocks noChangeAspect="1"/>
           </p:cNvPicPr>
-          <p:nvPr>
-            <p:ph idx="1"/>
-          </p:nvPr>
+          <p:nvPr/>
         </p:nvPicPr>
         <p:blipFill>
           <a:blip r:embed="rId2"/>
@@ -3851,17 +3881,56 @@
         </p:blipFill>
         <p:spPr>
           <a:xfrm>
-            <a:off x="1733550" y="2313782"/>
-            <a:ext cx="3467100" cy="3105150"/>
+            <a:off x="6096000" y="2351871"/>
+            <a:ext cx="4618812" cy="4141004"/>
           </a:xfrm>
+          <a:prstGeom prst="rect">
+            <a:avLst/>
+          </a:prstGeom>
         </p:spPr>
       </p:pic>
+      <p:sp>
+        <p:nvSpPr>
+          <p:cNvPr id="4" name="Marcador de contenido 3">
+            <a:extLst>
+              <a:ext uri="{FF2B5EF4-FFF2-40B4-BE49-F238E27FC236}">
+                <a16:creationId xmlns:a16="http://schemas.microsoft.com/office/drawing/2014/main" id="{5954AE0C-AFB4-4A69-86DF-18657D85A433}"/>
+              </a:ext>
+            </a:extLst>
+          </p:cNvPr>
+          <p:cNvSpPr>
+            <a:spLocks noGrp="1"/>
+          </p:cNvSpPr>
+          <p:nvPr>
+            <p:ph idx="1"/>
+          </p:nvPr>
+        </p:nvSpPr>
+        <p:spPr/>
+        <p:txBody>
+          <a:bodyPr/>
+          <a:lstStyle/>
+          <a:p>
+            <a:r>
+              <a:rPr lang="es-PE" dirty="0"/>
+              <a:t>Abrir </a:t>
+            </a:r>
+            <a:r>
+              <a:rPr lang="es-PE" b="1" dirty="0"/>
+              <a:t>Microsoft SQL Server Management Studio 18</a:t>
+            </a:r>
+            <a:r>
+              <a:rPr lang="es-PE" dirty="0"/>
+              <a:t>.</a:t>
+            </a:r>
+          </a:p>
+        </p:txBody>
+      </p:sp>
       <p:pic>
         <p:nvPicPr>
-          <p:cNvPr id="6" name="Marcador de contenido 6">
-            <a:extLst>
-              <a:ext uri="{FF2B5EF4-FFF2-40B4-BE49-F238E27FC236}">
-                <a16:creationId xmlns:a16="http://schemas.microsoft.com/office/drawing/2014/main" id="{3724DE91-0E94-4E3B-BEC8-160957424C7A}"/>
+          <p:cNvPr id="7" name="Marcador de contenido 4">
+            <a:extLst>
+              <a:ext uri="{FF2B5EF4-FFF2-40B4-BE49-F238E27FC236}">
+                <a16:creationId xmlns:a16="http://schemas.microsoft.com/office/drawing/2014/main" id="{601E3DFD-8F07-4719-B738-5FBC169AF1A4}"/>
               </a:ext>
             </a:extLst>
           </p:cNvPr>
@@ -3878,8 +3947,8 @@
         </p:blipFill>
         <p:spPr>
           <a:xfrm>
-            <a:off x="6096000" y="1690688"/>
-            <a:ext cx="4853415" cy="4351338"/>
+            <a:off x="1733550" y="2824334"/>
+            <a:ext cx="3467100" cy="3105150"/>
           </a:xfrm>
           <a:prstGeom prst="rect">
             <a:avLst/>

</xml_diff>